<commit_message>
added automatic restults pptx maker
</commit_message>
<xml_diff>
--- a/algosystem/backtesting/dashboard/utils/template.pptx
+++ b/algosystem/backtesting/dashboard/utils/template.pptx
@@ -5,14 +5,10 @@
     <p:sldMasterId id="2147483648" r:id="rId4"/>
   </p:sldMasterIdLst>
   <p:notesMasterIdLst>
-    <p:notesMasterId r:id="rId10"/>
+    <p:notesMasterId r:id="rId6"/>
   </p:notesMasterIdLst>
   <p:sldIdLst>
-    <p:sldId id="258" r:id="rId5"/>
-    <p:sldId id="385" r:id="rId6"/>
-    <p:sldId id="446" r:id="rId7"/>
-    <p:sldId id="447" r:id="rId8"/>
-    <p:sldId id="445" r:id="rId9"/>
+    <p:sldId id="447" r:id="rId5"/>
   </p:sldIdLst>
   <p:sldSz cx="12192000" cy="6858000"/>
   <p:notesSz cx="7023100" cy="9309100"/>
@@ -116,11 +112,7 @@
       <p14:sectionLst xmlns:p14="http://schemas.microsoft.com/office/powerpoint/2010/main">
         <p14:section name="Default Section" id="{38A5C69F-731F-3D40-9836-5A3B2D004D11}">
           <p14:sldIdLst>
-            <p14:sldId id="258"/>
-            <p14:sldId id="385"/>
-            <p14:sldId id="446"/>
             <p14:sldId id="447"/>
-            <p14:sldId id="445"/>
           </p14:sldIdLst>
         </p14:section>
       </p14:sectionLst>
@@ -135,9 +127,76 @@
 <file path=ppt/revisionInfo.xml><?xml version="1.0" encoding="utf-8"?>
 <p1510:revInfo xmlns:a="http://schemas.openxmlformats.org/drawingml/2006/main" xmlns:r="http://schemas.openxmlformats.org/officeDocument/2006/relationships" xmlns:p1510="http://schemas.microsoft.com/office/powerpoint/2015/10/main">
   <p1510:revLst>
-    <p1510:client id="{2F82AE5F-FD08-37ED-BF48-82EABF5B8A6C}" v="34" dt="2025-10-12T03:30:23.106"/>
+    <p1510:client id="{099D45AA-6AD4-BC42-D4C5-16C9298E75BD}" v="4" dt="2025-10-19T22:20:14"/>
+    <p1510:client id="{46D4E29B-B6E1-7E70-818F-1B2CB342D481}" v="1" dt="2025-10-20T23:12:05.911"/>
   </p1510:revLst>
 </p1510:revInfo>
+</file>
+
+<file path=ppt/changesInfos/changesInfo1.xml><?xml version="1.0" encoding="utf-8"?>
+<pc:chgInfo xmlns:a="http://schemas.openxmlformats.org/drawingml/2006/main" xmlns:r="http://schemas.openxmlformats.org/officeDocument/2006/relationships" xmlns:ac="http://schemas.microsoft.com/office/drawing/2013/main/command" xmlns:pc="http://schemas.microsoft.com/office/powerpoint/2013/main/command">
+  <pc:docChgLst>
+    <pc:chgData name="Dupuy, Dominick" userId="S::dominickdupuy@ufl.edu::be4d73ba-ad9d-445c-acc8-b6a7b16e1b7c" providerId="AD" clId="Web-{46D4E29B-B6E1-7E70-818F-1B2CB342D481}"/>
+    <pc:docChg chg="modSld">
+      <pc:chgData name="Dupuy, Dominick" userId="S::dominickdupuy@ufl.edu::be4d73ba-ad9d-445c-acc8-b6a7b16e1b7c" providerId="AD" clId="Web-{46D4E29B-B6E1-7E70-818F-1B2CB342D481}" dt="2025-10-20T23:12:05.911" v="0"/>
+      <pc:docMkLst>
+        <pc:docMk/>
+      </pc:docMkLst>
+      <pc:sldChg chg="delSp">
+        <pc:chgData name="Dupuy, Dominick" userId="S::dominickdupuy@ufl.edu::be4d73ba-ad9d-445c-acc8-b6a7b16e1b7c" providerId="AD" clId="Web-{46D4E29B-B6E1-7E70-818F-1B2CB342D481}" dt="2025-10-20T23:12:05.911" v="0"/>
+        <pc:sldMkLst>
+          <pc:docMk/>
+          <pc:sldMk cId="2841728166" sldId="447"/>
+        </pc:sldMkLst>
+        <pc:spChg chg="del">
+          <ac:chgData name="Dupuy, Dominick" userId="S::dominickdupuy@ufl.edu::be4d73ba-ad9d-445c-acc8-b6a7b16e1b7c" providerId="AD" clId="Web-{46D4E29B-B6E1-7E70-818F-1B2CB342D481}" dt="2025-10-20T23:12:05.911" v="0"/>
+          <ac:spMkLst>
+            <pc:docMk/>
+            <pc:sldMk cId="2841728166" sldId="447"/>
+            <ac:spMk id="3" creationId="{B03646E6-2296-1289-7638-671D2FDAFE68}"/>
+          </ac:spMkLst>
+        </pc:spChg>
+      </pc:sldChg>
+    </pc:docChg>
+  </pc:docChgLst>
+  <pc:docChgLst>
+    <pc:chgData name="Dupuy, Dominick" userId="S::dominickdupuy@ufl.edu::be4d73ba-ad9d-445c-acc8-b6a7b16e1b7c" providerId="AD" clId="Web-{099D45AA-6AD4-BC42-D4C5-16C9298E75BD}"/>
+    <pc:docChg chg="delSld modSection">
+      <pc:chgData name="Dupuy, Dominick" userId="S::dominickdupuy@ufl.edu::be4d73ba-ad9d-445c-acc8-b6a7b16e1b7c" providerId="AD" clId="Web-{099D45AA-6AD4-BC42-D4C5-16C9298E75BD}" dt="2025-10-19T22:20:14" v="3"/>
+      <pc:docMkLst>
+        <pc:docMk/>
+      </pc:docMkLst>
+      <pc:sldChg chg="del">
+        <pc:chgData name="Dupuy, Dominick" userId="S::dominickdupuy@ufl.edu::be4d73ba-ad9d-445c-acc8-b6a7b16e1b7c" providerId="AD" clId="Web-{099D45AA-6AD4-BC42-D4C5-16C9298E75BD}" dt="2025-10-19T22:20:10.203" v="0"/>
+        <pc:sldMkLst>
+          <pc:docMk/>
+          <pc:sldMk cId="2804371423" sldId="258"/>
+        </pc:sldMkLst>
+      </pc:sldChg>
+      <pc:sldChg chg="del">
+        <pc:chgData name="Dupuy, Dominick" userId="S::dominickdupuy@ufl.edu::be4d73ba-ad9d-445c-acc8-b6a7b16e1b7c" providerId="AD" clId="Web-{099D45AA-6AD4-BC42-D4C5-16C9298E75BD}" dt="2025-10-19T22:20:11.953" v="1"/>
+        <pc:sldMkLst>
+          <pc:docMk/>
+          <pc:sldMk cId="511173342" sldId="385"/>
+        </pc:sldMkLst>
+      </pc:sldChg>
+      <pc:sldChg chg="del">
+        <pc:chgData name="Dupuy, Dominick" userId="S::dominickdupuy@ufl.edu::be4d73ba-ad9d-445c-acc8-b6a7b16e1b7c" providerId="AD" clId="Web-{099D45AA-6AD4-BC42-D4C5-16C9298E75BD}" dt="2025-10-19T22:20:14" v="3"/>
+        <pc:sldMkLst>
+          <pc:docMk/>
+          <pc:sldMk cId="3289234773" sldId="445"/>
+        </pc:sldMkLst>
+      </pc:sldChg>
+      <pc:sldChg chg="del">
+        <pc:chgData name="Dupuy, Dominick" userId="S::dominickdupuy@ufl.edu::be4d73ba-ad9d-445c-acc8-b6a7b16e1b7c" providerId="AD" clId="Web-{099D45AA-6AD4-BC42-D4C5-16C9298E75BD}" dt="2025-10-19T22:20:12.922" v="2"/>
+        <pc:sldMkLst>
+          <pc:docMk/>
+          <pc:sldMk cId="703896995" sldId="446"/>
+        </pc:sldMkLst>
+      </pc:sldChg>
+    </pc:docChg>
+  </pc:docChgLst>
+</pc:chgInfo>
 </file>
 
 <file path=ppt/notesMasters/notesMaster1.xml><?xml version="1.0" encoding="utf-8"?>
@@ -222,7 +281,7 @@
           <a:p>
             <a:fld id="{30012786-B68D-194B-9851-6F01D6730E7E}" type="datetimeFigureOut">
               <a:rPr lang="en-US" smtClean="0"/>
-              <a:t>10/19/2025</a:t>
+              <a:t>10/20/2025</a:t>
             </a:fld>
             <a:endParaRPr lang="en-US"/>
           </a:p>
@@ -864,7 +923,7 @@
           <a:p>
             <a:fld id="{B389FA2E-C303-4F63-AE6B-4C5D98419F56}" type="datetime1">
               <a:rPr lang="en-US" smtClean="0"/>
-              <a:t>10/19/2025</a:t>
+              <a:t>10/20/2025</a:t>
             </a:fld>
             <a:endParaRPr lang="en-US"/>
           </a:p>
@@ -1072,7 +1131,7 @@
           <a:p>
             <a:fld id="{EF8CEDEA-6B5F-42E3-8404-4D808F24C050}" type="datetime1">
               <a:rPr lang="en-US" smtClean="0"/>
-              <a:t>10/19/2025</a:t>
+              <a:t>10/20/2025</a:t>
             </a:fld>
             <a:endParaRPr lang="en-US"/>
           </a:p>
@@ -2104,7 +2163,7 @@
           <a:p>
             <a:fld id="{DE72EF48-9EC9-4D64-B8B1-66509736220E}" type="datetime1">
               <a:rPr lang="en-US" smtClean="0"/>
-              <a:t>10/19/2025</a:t>
+              <a:t>10/20/2025</a:t>
             </a:fld>
             <a:endParaRPr lang="en-US"/>
           </a:p>
@@ -2516,7 +2575,7 @@
           <a:p>
             <a:fld id="{149B2486-3403-4A9F-8919-C754C46C58DC}" type="datetime1">
               <a:rPr lang="en-US" smtClean="0"/>
-              <a:t>10/19/2025</a:t>
+              <a:t>10/20/2025</a:t>
             </a:fld>
             <a:endParaRPr lang="en-US"/>
           </a:p>
@@ -2657,7 +2716,7 @@
           <a:p>
             <a:fld id="{B8BEB36E-D1D7-404A-BD6A-75C171ECB795}" type="datetime1">
               <a:rPr lang="en-US" smtClean="0"/>
-              <a:t>10/19/2025</a:t>
+              <a:t>10/20/2025</a:t>
             </a:fld>
             <a:endParaRPr lang="en-US"/>
           </a:p>
@@ -2770,7 +2829,7 @@
           <a:p>
             <a:fld id="{71D3C6E6-169F-4063-B599-7C27D19E08EF}" type="datetime1">
               <a:rPr lang="en-US" smtClean="0"/>
-              <a:t>10/19/2025</a:t>
+              <a:t>10/20/2025</a:t>
             </a:fld>
             <a:endParaRPr lang="en-US"/>
           </a:p>
@@ -3081,7 +3140,7 @@
           <a:p>
             <a:fld id="{F8F991B0-9705-4BCF-9F61-30733382C6AB}" type="datetime1">
               <a:rPr lang="en-US" smtClean="0"/>
-              <a:t>10/19/2025</a:t>
+              <a:t>10/20/2025</a:t>
             </a:fld>
             <a:endParaRPr lang="en-US"/>
           </a:p>
@@ -3372,7 +3431,7 @@
           <a:p>
             <a:fld id="{B122781B-5CB6-46C0-8970-B89EEBBD16F8}" type="datetime1">
               <a:rPr lang="en-US" smtClean="0"/>
-              <a:t>10/19/2025</a:t>
+              <a:t>10/20/2025</a:t>
             </a:fld>
             <a:endParaRPr lang="en-US"/>
           </a:p>
@@ -3613,7 +3672,7 @@
           <a:p>
             <a:fld id="{86E4D7D4-74BD-4DA3-A0A0-1C0A711866D8}" type="datetime1">
               <a:rPr lang="en-US" smtClean="0"/>
-              <a:t>10/19/2025</a:t>
+              <a:t>10/20/2025</a:t>
             </a:fld>
             <a:endParaRPr lang="en-US"/>
           </a:p>
@@ -4020,963 +4079,6 @@
   <p:cSld>
     <p:spTree>
       <p:nvGrpSpPr>
-        <p:cNvPr id="1" name=""/>
-        <p:cNvGrpSpPr/>
-        <p:nvPr/>
-      </p:nvGrpSpPr>
-      <p:grpSpPr>
-        <a:xfrm>
-          <a:off x="0" y="0"/>
-          <a:ext cx="0" cy="0"/>
-          <a:chOff x="0" y="0"/>
-          <a:chExt cx="0" cy="0"/>
-        </a:xfrm>
-      </p:grpSpPr>
-      <p:sp>
-        <p:nvSpPr>
-          <p:cNvPr id="2" name="Rectangle 1">
-            <a:extLst>
-              <a:ext uri="{FF2B5EF4-FFF2-40B4-BE49-F238E27FC236}">
-                <a16:creationId xmlns:a16="http://schemas.microsoft.com/office/drawing/2014/main" id="{5E2C18ED-F9DE-836A-A247-1F47EF913DF1}"/>
-              </a:ext>
-            </a:extLst>
-          </p:cNvPr>
-          <p:cNvSpPr/>
-          <p:nvPr/>
-        </p:nvSpPr>
-        <p:spPr>
-          <a:xfrm>
-            <a:off x="8984688" y="51071"/>
-            <a:ext cx="3162300" cy="1154749"/>
-          </a:xfrm>
-          <a:prstGeom prst="rect">
-            <a:avLst/>
-          </a:prstGeom>
-          <a:solidFill>
-            <a:schemeClr val="bg1"/>
-          </a:solidFill>
-          <a:ln>
-            <a:noFill/>
-          </a:ln>
-        </p:spPr>
-        <p:style>
-          <a:lnRef idx="2">
-            <a:schemeClr val="accent1">
-              <a:shade val="15000"/>
-            </a:schemeClr>
-          </a:lnRef>
-          <a:fillRef idx="1">
-            <a:schemeClr val="accent1"/>
-          </a:fillRef>
-          <a:effectRef idx="0">
-            <a:schemeClr val="accent1"/>
-          </a:effectRef>
-          <a:fontRef idx="minor">
-            <a:schemeClr val="lt1"/>
-          </a:fontRef>
-        </p:style>
-        <p:txBody>
-          <a:bodyPr rtlCol="0" anchor="ctr"/>
-          <a:lstStyle/>
-          <a:p>
-            <a:pPr algn="ctr"/>
-            <a:endParaRPr lang="en-US"/>
-          </a:p>
-        </p:txBody>
-      </p:sp>
-      <p:sp>
-        <p:nvSpPr>
-          <p:cNvPr id="8" name="Rectangle 7">
-            <a:extLst>
-              <a:ext uri="{FF2B5EF4-FFF2-40B4-BE49-F238E27FC236}">
-                <a16:creationId xmlns:a16="http://schemas.microsoft.com/office/drawing/2014/main" id="{A013CBE8-8FF1-A340-B35F-83C34C9EA10E}"/>
-              </a:ext>
-            </a:extLst>
-          </p:cNvPr>
-          <p:cNvSpPr/>
-          <p:nvPr/>
-        </p:nvSpPr>
-        <p:spPr>
-          <a:xfrm>
-            <a:off x="-204186" y="5045710"/>
-            <a:ext cx="12677312" cy="1154749"/>
-          </a:xfrm>
-          <a:prstGeom prst="rect">
-            <a:avLst/>
-          </a:prstGeom>
-          <a:solidFill>
-            <a:schemeClr val="accent1"/>
-          </a:solidFill>
-          <a:ln w="38100">
-            <a:solidFill>
-              <a:schemeClr val="tx1"/>
-            </a:solidFill>
-          </a:ln>
-          <a:effectLst>
-            <a:outerShdw blurRad="50800" dist="38100" dir="2700000" algn="tl" rotWithShape="0">
-              <a:prstClr val="black">
-                <a:alpha val="40000"/>
-              </a:prstClr>
-            </a:outerShdw>
-          </a:effectLst>
-        </p:spPr>
-        <p:style>
-          <a:lnRef idx="2">
-            <a:schemeClr val="accent1">
-              <a:shade val="50000"/>
-            </a:schemeClr>
-          </a:lnRef>
-          <a:fillRef idx="1">
-            <a:schemeClr val="accent1"/>
-          </a:fillRef>
-          <a:effectRef idx="0">
-            <a:schemeClr val="accent1"/>
-          </a:effectRef>
-          <a:fontRef idx="minor">
-            <a:schemeClr val="lt1"/>
-          </a:fontRef>
-        </p:style>
-        <p:txBody>
-          <a:bodyPr rtlCol="0" anchor="ctr"/>
-          <a:lstStyle/>
-          <a:p>
-            <a:pPr algn="ctr"/>
-            <a:endParaRPr lang="en-US"/>
-          </a:p>
-        </p:txBody>
-      </p:sp>
-      <p:sp>
-        <p:nvSpPr>
-          <p:cNvPr id="6" name="Subtitle 2">
-            <a:extLst>
-              <a:ext uri="{FF2B5EF4-FFF2-40B4-BE49-F238E27FC236}">
-                <a16:creationId xmlns:a16="http://schemas.microsoft.com/office/drawing/2014/main" id="{7BB985EF-E433-6E43-828C-46E3B4BB7005}"/>
-              </a:ext>
-            </a:extLst>
-          </p:cNvPr>
-          <p:cNvSpPr txBox="1">
-            <a:spLocks/>
-          </p:cNvSpPr>
-          <p:nvPr/>
-        </p:nvSpPr>
-        <p:spPr>
-          <a:xfrm>
-            <a:off x="3576020" y="5160729"/>
-            <a:ext cx="8071268" cy="635954"/>
-          </a:xfrm>
-          <a:prstGeom prst="rect">
-            <a:avLst/>
-          </a:prstGeom>
-          <a:solidFill>
-            <a:schemeClr val="accent1"/>
-          </a:solidFill>
-        </p:spPr>
-        <p:txBody>
-          <a:bodyPr vert="horz" lIns="91440" tIns="45720" rIns="91440" bIns="45720" rtlCol="0" anchor="b">
-            <a:noAutofit/>
-          </a:bodyPr>
-          <a:lstStyle>
-            <a:lvl1pPr marL="0" indent="0" algn="ctr" defTabSz="914400" rtl="0" eaLnBrk="1" latinLnBrk="0" hangingPunct="1">
-              <a:lnSpc>
-                <a:spcPct val="90000"/>
-              </a:lnSpc>
-              <a:spcBef>
-                <a:spcPts val="1000"/>
-              </a:spcBef>
-              <a:buFont typeface="Arial" panose="020B0604020202020204" pitchFamily="34" charset="0"/>
-              <a:buNone/>
-              <a:defRPr sz="2400" kern="1200">
-                <a:solidFill>
-                  <a:schemeClr val="tx1"/>
-                </a:solidFill>
-                <a:latin typeface="+mn-lt"/>
-                <a:ea typeface="+mn-ea"/>
-                <a:cs typeface="+mn-cs"/>
-              </a:defRPr>
-            </a:lvl1pPr>
-            <a:lvl2pPr marL="457200" indent="0" algn="ctr" defTabSz="914400" rtl="0" eaLnBrk="1" latinLnBrk="0" hangingPunct="1">
-              <a:lnSpc>
-                <a:spcPct val="90000"/>
-              </a:lnSpc>
-              <a:spcBef>
-                <a:spcPts val="500"/>
-              </a:spcBef>
-              <a:buFont typeface="Arial" panose="020B0604020202020204" pitchFamily="34" charset="0"/>
-              <a:buNone/>
-              <a:defRPr sz="2000" kern="1200">
-                <a:solidFill>
-                  <a:schemeClr val="tx1"/>
-                </a:solidFill>
-                <a:latin typeface="+mn-lt"/>
-                <a:ea typeface="+mn-ea"/>
-                <a:cs typeface="+mn-cs"/>
-              </a:defRPr>
-            </a:lvl2pPr>
-            <a:lvl3pPr marL="914400" indent="0" algn="ctr" defTabSz="914400" rtl="0" eaLnBrk="1" latinLnBrk="0" hangingPunct="1">
-              <a:lnSpc>
-                <a:spcPct val="90000"/>
-              </a:lnSpc>
-              <a:spcBef>
-                <a:spcPts val="500"/>
-              </a:spcBef>
-              <a:buFont typeface="Arial" panose="020B0604020202020204" pitchFamily="34" charset="0"/>
-              <a:buNone/>
-              <a:defRPr sz="1800" kern="1200">
-                <a:solidFill>
-                  <a:schemeClr val="tx1"/>
-                </a:solidFill>
-                <a:latin typeface="+mn-lt"/>
-                <a:ea typeface="+mn-ea"/>
-                <a:cs typeface="+mn-cs"/>
-              </a:defRPr>
-            </a:lvl3pPr>
-            <a:lvl4pPr marL="1371600" indent="0" algn="ctr" defTabSz="914400" rtl="0" eaLnBrk="1" latinLnBrk="0" hangingPunct="1">
-              <a:lnSpc>
-                <a:spcPct val="90000"/>
-              </a:lnSpc>
-              <a:spcBef>
-                <a:spcPts val="500"/>
-              </a:spcBef>
-              <a:buFont typeface="Arial" panose="020B0604020202020204" pitchFamily="34" charset="0"/>
-              <a:buNone/>
-              <a:defRPr sz="1600" kern="1200">
-                <a:solidFill>
-                  <a:schemeClr val="tx1"/>
-                </a:solidFill>
-                <a:latin typeface="+mn-lt"/>
-                <a:ea typeface="+mn-ea"/>
-                <a:cs typeface="+mn-cs"/>
-              </a:defRPr>
-            </a:lvl4pPr>
-            <a:lvl5pPr marL="1828800" indent="0" algn="ctr" defTabSz="914400" rtl="0" eaLnBrk="1" latinLnBrk="0" hangingPunct="1">
-              <a:lnSpc>
-                <a:spcPct val="90000"/>
-              </a:lnSpc>
-              <a:spcBef>
-                <a:spcPts val="500"/>
-              </a:spcBef>
-              <a:buFont typeface="Arial" panose="020B0604020202020204" pitchFamily="34" charset="0"/>
-              <a:buNone/>
-              <a:defRPr sz="1600" kern="1200">
-                <a:solidFill>
-                  <a:schemeClr val="tx1"/>
-                </a:solidFill>
-                <a:latin typeface="+mn-lt"/>
-                <a:ea typeface="+mn-ea"/>
-                <a:cs typeface="+mn-cs"/>
-              </a:defRPr>
-            </a:lvl5pPr>
-            <a:lvl6pPr marL="2286000" indent="0" algn="ctr" defTabSz="914400" rtl="0" eaLnBrk="1" latinLnBrk="0" hangingPunct="1">
-              <a:lnSpc>
-                <a:spcPct val="90000"/>
-              </a:lnSpc>
-              <a:spcBef>
-                <a:spcPts val="500"/>
-              </a:spcBef>
-              <a:buFont typeface="Arial" panose="020B0604020202020204" pitchFamily="34" charset="0"/>
-              <a:buNone/>
-              <a:defRPr sz="1600" kern="1200">
-                <a:solidFill>
-                  <a:schemeClr val="tx1"/>
-                </a:solidFill>
-                <a:latin typeface="+mn-lt"/>
-                <a:ea typeface="+mn-ea"/>
-                <a:cs typeface="+mn-cs"/>
-              </a:defRPr>
-            </a:lvl6pPr>
-            <a:lvl7pPr marL="2743200" indent="0" algn="ctr" defTabSz="914400" rtl="0" eaLnBrk="1" latinLnBrk="0" hangingPunct="1">
-              <a:lnSpc>
-                <a:spcPct val="90000"/>
-              </a:lnSpc>
-              <a:spcBef>
-                <a:spcPts val="500"/>
-              </a:spcBef>
-              <a:buFont typeface="Arial" panose="020B0604020202020204" pitchFamily="34" charset="0"/>
-              <a:buNone/>
-              <a:defRPr sz="1600" kern="1200">
-                <a:solidFill>
-                  <a:schemeClr val="tx1"/>
-                </a:solidFill>
-                <a:latin typeface="+mn-lt"/>
-                <a:ea typeface="+mn-ea"/>
-                <a:cs typeface="+mn-cs"/>
-              </a:defRPr>
-            </a:lvl7pPr>
-            <a:lvl8pPr marL="3200400" indent="0" algn="ctr" defTabSz="914400" rtl="0" eaLnBrk="1" latinLnBrk="0" hangingPunct="1">
-              <a:lnSpc>
-                <a:spcPct val="90000"/>
-              </a:lnSpc>
-              <a:spcBef>
-                <a:spcPts val="500"/>
-              </a:spcBef>
-              <a:buFont typeface="Arial" panose="020B0604020202020204" pitchFamily="34" charset="0"/>
-              <a:buNone/>
-              <a:defRPr sz="1600" kern="1200">
-                <a:solidFill>
-                  <a:schemeClr val="tx1"/>
-                </a:solidFill>
-                <a:latin typeface="+mn-lt"/>
-                <a:ea typeface="+mn-ea"/>
-                <a:cs typeface="+mn-cs"/>
-              </a:defRPr>
-            </a:lvl8pPr>
-            <a:lvl9pPr marL="3657600" indent="0" algn="ctr" defTabSz="914400" rtl="0" eaLnBrk="1" latinLnBrk="0" hangingPunct="1">
-              <a:lnSpc>
-                <a:spcPct val="90000"/>
-              </a:lnSpc>
-              <a:spcBef>
-                <a:spcPts val="500"/>
-              </a:spcBef>
-              <a:buFont typeface="Arial" panose="020B0604020202020204" pitchFamily="34" charset="0"/>
-              <a:buNone/>
-              <a:defRPr sz="1600" kern="1200">
-                <a:solidFill>
-                  <a:schemeClr val="tx1"/>
-                </a:solidFill>
-                <a:latin typeface="+mn-lt"/>
-                <a:ea typeface="+mn-ea"/>
-                <a:cs typeface="+mn-cs"/>
-              </a:defRPr>
-            </a:lvl9pPr>
-          </a:lstStyle>
-          <a:p>
-            <a:pPr algn="r">
-              <a:lnSpc>
-                <a:spcPct val="110000"/>
-              </a:lnSpc>
-            </a:pPr>
-            <a:r>
-              <a:rPr lang="en-US" sz="4400" b="1" spc="50" dirty="0">
-                <a:solidFill>
-                  <a:schemeClr val="bg1"/>
-                </a:solidFill>
-                <a:latin typeface="+mj-lt"/>
-                <a:cs typeface="Bai Jamjuree Medium" panose="00000600000000000000" pitchFamily="2" charset="-34"/>
-              </a:rPr>
-              <a:t>Investment Proposal</a:t>
-            </a:r>
-          </a:p>
-        </p:txBody>
-      </p:sp>
-      <p:sp>
-        <p:nvSpPr>
-          <p:cNvPr id="4" name="Isosceles Triangle 3">
-            <a:extLst>
-              <a:ext uri="{FF2B5EF4-FFF2-40B4-BE49-F238E27FC236}">
-                <a16:creationId xmlns:a16="http://schemas.microsoft.com/office/drawing/2014/main" id="{DE7EBC71-E7E8-B98A-0E4A-704FC08B07FE}"/>
-              </a:ext>
-            </a:extLst>
-          </p:cNvPr>
-          <p:cNvSpPr/>
-          <p:nvPr/>
-        </p:nvSpPr>
-        <p:spPr>
-          <a:xfrm rot="16200000">
-            <a:off x="11517215" y="228685"/>
-            <a:ext cx="670243" cy="589302"/>
-          </a:xfrm>
-          <a:prstGeom prst="triangle">
-            <a:avLst>
-              <a:gd name="adj" fmla="val 51351"/>
-            </a:avLst>
-          </a:prstGeom>
-          <a:solidFill>
-            <a:schemeClr val="accent4">
-              <a:lumMod val="75000"/>
-            </a:schemeClr>
-          </a:solidFill>
-          <a:ln>
-            <a:noFill/>
-          </a:ln>
-          <a:effectLst>
-            <a:outerShdw blurRad="50800" dist="38100" dir="2700000" algn="tl" rotWithShape="0">
-              <a:prstClr val="black">
-                <a:alpha val="40000"/>
-              </a:prstClr>
-            </a:outerShdw>
-          </a:effectLst>
-        </p:spPr>
-        <p:style>
-          <a:lnRef idx="2">
-            <a:schemeClr val="accent1">
-              <a:shade val="15000"/>
-            </a:schemeClr>
-          </a:lnRef>
-          <a:fillRef idx="1">
-            <a:schemeClr val="accent1"/>
-          </a:fillRef>
-          <a:effectRef idx="0">
-            <a:schemeClr val="accent1"/>
-          </a:effectRef>
-          <a:fontRef idx="minor">
-            <a:schemeClr val="lt1"/>
-          </a:fontRef>
-        </p:style>
-        <p:txBody>
-          <a:bodyPr rtlCol="0" anchor="ctr"/>
-          <a:lstStyle/>
-          <a:p>
-            <a:pPr algn="ctr"/>
-            <a:endParaRPr lang="en-US"/>
-          </a:p>
-        </p:txBody>
-      </p:sp>
-      <p:sp>
-        <p:nvSpPr>
-          <p:cNvPr id="5" name="Isosceles Triangle 4">
-            <a:extLst>
-              <a:ext uri="{FF2B5EF4-FFF2-40B4-BE49-F238E27FC236}">
-                <a16:creationId xmlns:a16="http://schemas.microsoft.com/office/drawing/2014/main" id="{95F77B34-E2F5-D2F6-56F6-1C14604C0DD5}"/>
-              </a:ext>
-            </a:extLst>
-          </p:cNvPr>
-          <p:cNvSpPr/>
-          <p:nvPr/>
-        </p:nvSpPr>
-        <p:spPr>
-          <a:xfrm rot="10800000">
-            <a:off x="10753417" y="-16476"/>
-            <a:ext cx="1472022" cy="493390"/>
-          </a:xfrm>
-          <a:prstGeom prst="triangle">
-            <a:avLst/>
-          </a:prstGeom>
-          <a:solidFill>
-            <a:schemeClr val="accent2"/>
-          </a:solidFill>
-          <a:ln>
-            <a:noFill/>
-          </a:ln>
-          <a:effectLst>
-            <a:outerShdw blurRad="50800" dist="38100" dir="2700000" algn="tl" rotWithShape="0">
-              <a:prstClr val="black">
-                <a:alpha val="40000"/>
-              </a:prstClr>
-            </a:outerShdw>
-          </a:effectLst>
-        </p:spPr>
-        <p:style>
-          <a:lnRef idx="2">
-            <a:schemeClr val="accent1">
-              <a:shade val="15000"/>
-            </a:schemeClr>
-          </a:lnRef>
-          <a:fillRef idx="1">
-            <a:schemeClr val="accent1"/>
-          </a:fillRef>
-          <a:effectRef idx="0">
-            <a:schemeClr val="accent1"/>
-          </a:effectRef>
-          <a:fontRef idx="minor">
-            <a:schemeClr val="lt1"/>
-          </a:fontRef>
-        </p:style>
-        <p:txBody>
-          <a:bodyPr rtlCol="0" anchor="ctr"/>
-          <a:lstStyle/>
-          <a:p>
-            <a:pPr algn="ctr"/>
-            <a:endParaRPr lang="en-US"/>
-          </a:p>
-        </p:txBody>
-      </p:sp>
-      <p:sp>
-        <p:nvSpPr>
-          <p:cNvPr id="7" name="Isosceles Triangle 6">
-            <a:extLst>
-              <a:ext uri="{FF2B5EF4-FFF2-40B4-BE49-F238E27FC236}">
-                <a16:creationId xmlns:a16="http://schemas.microsoft.com/office/drawing/2014/main" id="{8E99BE46-FB39-550F-2D9C-129782997879}"/>
-              </a:ext>
-            </a:extLst>
-          </p:cNvPr>
-          <p:cNvSpPr/>
-          <p:nvPr/>
-        </p:nvSpPr>
-        <p:spPr>
-          <a:xfrm rot="6920618">
-            <a:off x="11033566" y="-180661"/>
-            <a:ext cx="561474" cy="1676400"/>
-          </a:xfrm>
-          <a:prstGeom prst="triangle">
-            <a:avLst>
-              <a:gd name="adj" fmla="val 40370"/>
-            </a:avLst>
-          </a:prstGeom>
-          <a:solidFill>
-            <a:schemeClr val="accent1"/>
-          </a:solidFill>
-          <a:ln>
-            <a:noFill/>
-          </a:ln>
-          <a:effectLst>
-            <a:outerShdw blurRad="50800" dist="38100" dir="2700000" algn="tl" rotWithShape="0">
-              <a:prstClr val="black">
-                <a:alpha val="40000"/>
-              </a:prstClr>
-            </a:outerShdw>
-          </a:effectLst>
-        </p:spPr>
-        <p:style>
-          <a:lnRef idx="2">
-            <a:schemeClr val="accent1">
-              <a:shade val="15000"/>
-            </a:schemeClr>
-          </a:lnRef>
-          <a:fillRef idx="1">
-            <a:schemeClr val="accent1"/>
-          </a:fillRef>
-          <a:effectRef idx="0">
-            <a:schemeClr val="accent1"/>
-          </a:effectRef>
-          <a:fontRef idx="minor">
-            <a:schemeClr val="lt1"/>
-          </a:fontRef>
-        </p:style>
-        <p:txBody>
-          <a:bodyPr rtlCol="0" anchor="ctr"/>
-          <a:lstStyle/>
-          <a:p>
-            <a:pPr algn="ctr"/>
-            <a:endParaRPr lang="en-US"/>
-          </a:p>
-        </p:txBody>
-      </p:sp>
-      <p:sp>
-        <p:nvSpPr>
-          <p:cNvPr id="12" name="TextBox 11">
-            <a:extLst>
-              <a:ext uri="{FF2B5EF4-FFF2-40B4-BE49-F238E27FC236}">
-                <a16:creationId xmlns:a16="http://schemas.microsoft.com/office/drawing/2014/main" id="{97D9DD8F-B383-1204-2941-2FB550DA1F91}"/>
-              </a:ext>
-            </a:extLst>
-          </p:cNvPr>
-          <p:cNvSpPr txBox="1"/>
-          <p:nvPr/>
-        </p:nvSpPr>
-        <p:spPr>
-          <a:xfrm>
-            <a:off x="5053263" y="5622025"/>
-            <a:ext cx="6594025" cy="461665"/>
-          </a:xfrm>
-          <a:prstGeom prst="rect">
-            <a:avLst/>
-          </a:prstGeom>
-          <a:noFill/>
-        </p:spPr>
-        <p:txBody>
-          <a:bodyPr wrap="square" rtlCol="0">
-            <a:spAutoFit/>
-          </a:bodyPr>
-          <a:lstStyle/>
-          <a:p>
-            <a:pPr algn="r">
-              <a:spcBef>
-                <a:spcPts val="1000"/>
-              </a:spcBef>
-            </a:pPr>
-            <a:r>
-              <a:rPr lang="en-US" sz="2400" b="1" spc="50" dirty="0">
-                <a:solidFill>
-                  <a:schemeClr val="bg1"/>
-                </a:solidFill>
-                <a:latin typeface="+mj-lt"/>
-                <a:cs typeface="Bai Jamjuree Medium" panose="00000600000000000000" pitchFamily="2" charset="-34"/>
-              </a:rPr>
-              <a:t>[Day of week], [Month] [Day of month], [Year]</a:t>
-            </a:r>
-          </a:p>
-        </p:txBody>
-      </p:sp>
-      <p:pic>
-        <p:nvPicPr>
-          <p:cNvPr id="9" name="Picture 8" descr="A black and orange triangle with black text&#10;&#10;Description automatically generated">
-            <a:extLst>
-              <a:ext uri="{FF2B5EF4-FFF2-40B4-BE49-F238E27FC236}">
-                <a16:creationId xmlns:a16="http://schemas.microsoft.com/office/drawing/2014/main" id="{56EB8725-B89A-6292-C3C4-B4135418D08B}"/>
-              </a:ext>
-            </a:extLst>
-          </p:cNvPr>
-          <p:cNvPicPr>
-            <a:picLocks noChangeAspect="1"/>
-          </p:cNvPicPr>
-          <p:nvPr/>
-        </p:nvPicPr>
-        <p:blipFill rotWithShape="1">
-          <a:blip r:embed="rId2"/>
-          <a:srcRect t="32420" b="37268"/>
-          <a:stretch/>
-        </p:blipFill>
-        <p:spPr>
-          <a:xfrm>
-            <a:off x="3916682" y="475787"/>
-            <a:ext cx="3863333" cy="1171060"/>
-          </a:xfrm>
-          <a:prstGeom prst="rect">
-            <a:avLst/>
-          </a:prstGeom>
-        </p:spPr>
-      </p:pic>
-      <p:sp>
-        <p:nvSpPr>
-          <p:cNvPr id="10" name="Slide Number Placeholder 9">
-            <a:extLst>
-              <a:ext uri="{FF2B5EF4-FFF2-40B4-BE49-F238E27FC236}">
-                <a16:creationId xmlns:a16="http://schemas.microsoft.com/office/drawing/2014/main" id="{C675F8F5-7938-9DF4-9075-BF2CDFF970B6}"/>
-              </a:ext>
-            </a:extLst>
-          </p:cNvPr>
-          <p:cNvSpPr>
-            <a:spLocks noGrp="1"/>
-          </p:cNvSpPr>
-          <p:nvPr>
-            <p:ph type="sldNum" sz="quarter" idx="12"/>
-          </p:nvPr>
-        </p:nvSpPr>
-        <p:spPr/>
-        <p:txBody>
-          <a:bodyPr/>
-          <a:lstStyle/>
-          <a:p>
-            <a:fld id="{98D7FCF7-E335-7149-94FE-378378284473}" type="slidenum">
-              <a:rPr lang="en-US" smtClean="0"/>
-              <a:t>1</a:t>
-            </a:fld>
-            <a:endParaRPr lang="en-US"/>
-          </a:p>
-        </p:txBody>
-      </p:sp>
-      <p:sp>
-        <p:nvSpPr>
-          <p:cNvPr id="3" name="TextBox 2">
-            <a:extLst>
-              <a:ext uri="{FF2B5EF4-FFF2-40B4-BE49-F238E27FC236}">
-                <a16:creationId xmlns:a16="http://schemas.microsoft.com/office/drawing/2014/main" id="{EAA41A4A-0DF0-3267-2CFA-229F2480F5D3}"/>
-              </a:ext>
-            </a:extLst>
-          </p:cNvPr>
-          <p:cNvSpPr txBox="1"/>
-          <p:nvPr/>
-        </p:nvSpPr>
-        <p:spPr>
-          <a:xfrm>
-            <a:off x="1730138" y="2239396"/>
-            <a:ext cx="8236420" cy="1331711"/>
-          </a:xfrm>
-          <a:prstGeom prst="rect">
-            <a:avLst/>
-          </a:prstGeom>
-          <a:noFill/>
-        </p:spPr>
-        <p:txBody>
-          <a:bodyPr wrap="square" rtlCol="0">
-            <a:spAutoFit/>
-          </a:bodyPr>
-          <a:lstStyle/>
-          <a:p>
-            <a:pPr algn="ctr">
-              <a:lnSpc>
-                <a:spcPct val="150000"/>
-              </a:lnSpc>
-            </a:pPr>
-            <a:r>
-              <a:rPr lang="en-US" sz="3200" b="1" i="1" dirty="0"/>
-              <a:t>[Strategy Name]</a:t>
-            </a:r>
-          </a:p>
-          <a:p>
-            <a:pPr algn="ctr">
-              <a:lnSpc>
-                <a:spcPct val="150000"/>
-              </a:lnSpc>
-            </a:pPr>
-            <a:r>
-              <a:rPr lang="en-US" sz="2400" i="1" dirty="0"/>
-              <a:t>Team [#]: [Team Member 1, Team Member 2, Team Member 3]</a:t>
-            </a:r>
-          </a:p>
-        </p:txBody>
-      </p:sp>
-    </p:spTree>
-    <p:extLst>
-      <p:ext uri="{BB962C8B-B14F-4D97-AF65-F5344CB8AC3E}">
-        <p14:creationId xmlns:p14="http://schemas.microsoft.com/office/powerpoint/2010/main" val="2804371423"/>
-      </p:ext>
-    </p:extLst>
-  </p:cSld>
-  <p:clrMapOvr>
-    <a:masterClrMapping/>
-  </p:clrMapOvr>
-  <mc:AlternateContent xmlns:mc="http://schemas.openxmlformats.org/markup-compatibility/2006" xmlns:p159="http://schemas.microsoft.com/office/powerpoint/2015/09/main">
-    <mc:Choice Requires="p159">
-      <p:transition xmlns:p14="http://schemas.microsoft.com/office/powerpoint/2010/main" spd="slow" p14:dur="2000">
-        <p159:morph option="byObject"/>
-      </p:transition>
-    </mc:Choice>
-    <mc:Fallback xmlns="">
-      <p:transition spd="slow">
-        <p:fade/>
-      </p:transition>
-    </mc:Fallback>
-  </mc:AlternateContent>
-</p:sld>
-</file>
-
-<file path=ppt/slides/slide2.xml><?xml version="1.0" encoding="utf-8"?>
-<p:sld xmlns:a="http://schemas.openxmlformats.org/drawingml/2006/main" xmlns:r="http://schemas.openxmlformats.org/officeDocument/2006/relationships" xmlns:p="http://schemas.openxmlformats.org/presentationml/2006/main">
-  <p:cSld>
-    <p:spTree>
-      <p:nvGrpSpPr>
-        <p:cNvPr id="1" name=""/>
-        <p:cNvGrpSpPr/>
-        <p:nvPr/>
-      </p:nvGrpSpPr>
-      <p:grpSpPr>
-        <a:xfrm>
-          <a:off x="0" y="0"/>
-          <a:ext cx="0" cy="0"/>
-          <a:chOff x="0" y="0"/>
-          <a:chExt cx="0" cy="0"/>
-        </a:xfrm>
-      </p:grpSpPr>
-      <p:sp>
-        <p:nvSpPr>
-          <p:cNvPr id="2" name="Title 1">
-            <a:extLst>
-              <a:ext uri="{FF2B5EF4-FFF2-40B4-BE49-F238E27FC236}">
-                <a16:creationId xmlns:a16="http://schemas.microsoft.com/office/drawing/2014/main" id="{21B62DA4-FBBF-A887-D9C5-E84B835E1B7E}"/>
-              </a:ext>
-            </a:extLst>
-          </p:cNvPr>
-          <p:cNvSpPr>
-            <a:spLocks noGrp="1"/>
-          </p:cNvSpPr>
-          <p:nvPr>
-            <p:ph type="title"/>
-          </p:nvPr>
-        </p:nvSpPr>
-        <p:spPr>
-          <a:xfrm>
-            <a:off x="838200" y="-6350"/>
-            <a:ext cx="10515600" cy="1325563"/>
-          </a:xfrm>
-        </p:spPr>
-        <p:txBody>
-          <a:bodyPr/>
-          <a:lstStyle/>
-          <a:p>
-            <a:r>
-              <a:rPr lang="en-US" b="1" dirty="0"/>
-              <a:t>Agenda</a:t>
-            </a:r>
-          </a:p>
-        </p:txBody>
-      </p:sp>
-      <p:sp>
-        <p:nvSpPr>
-          <p:cNvPr id="3" name="Content Placeholder 2">
-            <a:extLst>
-              <a:ext uri="{FF2B5EF4-FFF2-40B4-BE49-F238E27FC236}">
-                <a16:creationId xmlns:a16="http://schemas.microsoft.com/office/drawing/2014/main" id="{35527A86-7BAF-673E-0D52-109806AA1380}"/>
-              </a:ext>
-            </a:extLst>
-          </p:cNvPr>
-          <p:cNvSpPr>
-            <a:spLocks noGrp="1"/>
-          </p:cNvSpPr>
-          <p:nvPr>
-            <p:ph idx="4294967295"/>
-          </p:nvPr>
-        </p:nvSpPr>
-        <p:spPr>
-          <a:xfrm>
-            <a:off x="838200" y="1048548"/>
-            <a:ext cx="9533467" cy="4972050"/>
-          </a:xfrm>
-        </p:spPr>
-        <p:txBody>
-          <a:bodyPr>
-            <a:normAutofit/>
-          </a:bodyPr>
-          <a:lstStyle/>
-          <a:p>
-            <a:pPr marL="971550" lvl="1" indent="-514350">
-              <a:lnSpc>
-                <a:spcPct val="120000"/>
-              </a:lnSpc>
-              <a:buFont typeface="+mj-lt"/>
-              <a:buAutoNum type="arabicPeriod"/>
-            </a:pPr>
-            <a:r>
-              <a:rPr lang="en-US" dirty="0">
-                <a:latin typeface="+mj-lt"/>
-              </a:rPr>
-              <a:t>[First Section]</a:t>
-            </a:r>
-          </a:p>
-          <a:p>
-            <a:pPr marL="514350" indent="-514350">
-              <a:lnSpc>
-                <a:spcPct val="120000"/>
-              </a:lnSpc>
-              <a:buFont typeface="+mj-lt"/>
-              <a:buAutoNum type="arabicPeriod"/>
-            </a:pPr>
-            <a:endParaRPr lang="en-US" dirty="0">
-              <a:latin typeface="+mj-lt"/>
-            </a:endParaRPr>
-          </a:p>
-        </p:txBody>
-      </p:sp>
-      <p:sp>
-        <p:nvSpPr>
-          <p:cNvPr id="4" name="Slide Number Placeholder 3">
-            <a:extLst>
-              <a:ext uri="{FF2B5EF4-FFF2-40B4-BE49-F238E27FC236}">
-                <a16:creationId xmlns:a16="http://schemas.microsoft.com/office/drawing/2014/main" id="{42225D5B-BF19-CEB9-1978-17865324D160}"/>
-              </a:ext>
-            </a:extLst>
-          </p:cNvPr>
-          <p:cNvSpPr>
-            <a:spLocks noGrp="1"/>
-          </p:cNvSpPr>
-          <p:nvPr>
-            <p:ph type="sldNum" sz="quarter" idx="12"/>
-          </p:nvPr>
-        </p:nvSpPr>
-        <p:spPr/>
-        <p:txBody>
-          <a:bodyPr/>
-          <a:lstStyle/>
-          <a:p>
-            <a:fld id="{98D7FCF7-E335-7149-94FE-378378284473}" type="slidenum">
-              <a:rPr lang="en-US" smtClean="0"/>
-              <a:pPr/>
-              <a:t>2</a:t>
-            </a:fld>
-            <a:endParaRPr lang="en-US"/>
-          </a:p>
-        </p:txBody>
-      </p:sp>
-    </p:spTree>
-    <p:extLst>
-      <p:ext uri="{BB962C8B-B14F-4D97-AF65-F5344CB8AC3E}">
-        <p14:creationId xmlns:p14="http://schemas.microsoft.com/office/powerpoint/2010/main" val="511173342"/>
-      </p:ext>
-    </p:extLst>
-  </p:cSld>
-  <p:clrMapOvr>
-    <a:masterClrMapping/>
-  </p:clrMapOvr>
-  <mc:AlternateContent xmlns:mc="http://schemas.openxmlformats.org/markup-compatibility/2006" xmlns:p159="http://schemas.microsoft.com/office/powerpoint/2015/09/main">
-    <mc:Choice Requires="p159">
-      <p:transition xmlns:p14="http://schemas.microsoft.com/office/powerpoint/2010/main" spd="slow" p14:dur="2000">
-        <p159:morph option="byObject"/>
-      </p:transition>
-    </mc:Choice>
-    <mc:Fallback xmlns="">
-      <p:transition spd="slow">
-        <p:fade/>
-      </p:transition>
-    </mc:Fallback>
-  </mc:AlternateContent>
-</p:sld>
-</file>
-
-<file path=ppt/slides/slide3.xml><?xml version="1.0" encoding="utf-8"?>
-<p:sld xmlns:a="http://schemas.openxmlformats.org/drawingml/2006/main" xmlns:r="http://schemas.openxmlformats.org/officeDocument/2006/relationships" xmlns:p="http://schemas.openxmlformats.org/presentationml/2006/main">
-  <p:cSld>
-    <p:spTree>
-      <p:nvGrpSpPr>
-        <p:cNvPr id="1" name=""/>
-        <p:cNvGrpSpPr/>
-        <p:nvPr/>
-      </p:nvGrpSpPr>
-      <p:grpSpPr>
-        <a:xfrm>
-          <a:off x="0" y="0"/>
-          <a:ext cx="0" cy="0"/>
-          <a:chOff x="0" y="0"/>
-          <a:chExt cx="0" cy="0"/>
-        </a:xfrm>
-      </p:grpSpPr>
-      <p:sp>
-        <p:nvSpPr>
-          <p:cNvPr id="2" name="Title 1">
-            <a:extLst>
-              <a:ext uri="{FF2B5EF4-FFF2-40B4-BE49-F238E27FC236}">
-                <a16:creationId xmlns:a16="http://schemas.microsoft.com/office/drawing/2014/main" id="{20CFFEEF-A0F0-C7AF-5288-E46363339996}"/>
-              </a:ext>
-            </a:extLst>
-          </p:cNvPr>
-          <p:cNvSpPr>
-            <a:spLocks noGrp="1"/>
-          </p:cNvSpPr>
-          <p:nvPr>
-            <p:ph type="title"/>
-          </p:nvPr>
-        </p:nvSpPr>
-        <p:spPr/>
-        <p:txBody>
-          <a:bodyPr>
-            <a:normAutofit fontScale="90000"/>
-          </a:bodyPr>
-          <a:lstStyle/>
-          <a:p>
-            <a:r>
-              <a:rPr lang="en-US" dirty="0"/>
-              <a:t>[First slide]</a:t>
-            </a:r>
-          </a:p>
-        </p:txBody>
-      </p:sp>
-      <p:sp>
-        <p:nvSpPr>
-          <p:cNvPr id="3" name="Slide Number Placeholder 2">
-            <a:extLst>
-              <a:ext uri="{FF2B5EF4-FFF2-40B4-BE49-F238E27FC236}">
-                <a16:creationId xmlns:a16="http://schemas.microsoft.com/office/drawing/2014/main" id="{A7802E36-9900-8B1A-4233-72954E52E323}"/>
-              </a:ext>
-            </a:extLst>
-          </p:cNvPr>
-          <p:cNvSpPr>
-            <a:spLocks noGrp="1"/>
-          </p:cNvSpPr>
-          <p:nvPr>
-            <p:ph type="sldNum" sz="quarter" idx="12"/>
-          </p:nvPr>
-        </p:nvSpPr>
-        <p:spPr/>
-        <p:txBody>
-          <a:bodyPr/>
-          <a:lstStyle/>
-          <a:p>
-            <a:fld id="{98D7FCF7-E335-7149-94FE-378378284473}" type="slidenum">
-              <a:rPr lang="en-US" smtClean="0"/>
-              <a:pPr/>
-              <a:t>3</a:t>
-            </a:fld>
-            <a:endParaRPr lang="en-US"/>
-          </a:p>
-        </p:txBody>
-      </p:sp>
-    </p:spTree>
-    <p:extLst>
-      <p:ext uri="{BB962C8B-B14F-4D97-AF65-F5344CB8AC3E}">
-        <p14:creationId xmlns:p14="http://schemas.microsoft.com/office/powerpoint/2010/main" val="703896995"/>
-      </p:ext>
-    </p:extLst>
-  </p:cSld>
-  <p:clrMapOvr>
-    <a:masterClrMapping/>
-  </p:clrMapOvr>
-</p:sld>
-</file>
-
-<file path=ppt/slides/slide4.xml><?xml version="1.0" encoding="utf-8"?>
-<p:sld xmlns:a="http://schemas.openxmlformats.org/drawingml/2006/main" xmlns:r="http://schemas.openxmlformats.org/officeDocument/2006/relationships" xmlns:p="http://schemas.openxmlformats.org/presentationml/2006/main">
-  <p:cSld>
-    <p:spTree>
-      <p:nvGrpSpPr>
         <p:cNvPr id="1" name="">
           <a:extLst>
             <a:ext uri="{FF2B5EF4-FFF2-40B4-BE49-F238E27FC236}">
@@ -5027,36 +4129,6 @@
       </p:sp>
       <p:sp>
         <p:nvSpPr>
-          <p:cNvPr id="3" name="Slide Number Placeholder 2">
-            <a:extLst>
-              <a:ext uri="{FF2B5EF4-FFF2-40B4-BE49-F238E27FC236}">
-                <a16:creationId xmlns:a16="http://schemas.microsoft.com/office/drawing/2014/main" id="{B03646E6-2296-1289-7638-671D2FDAFE68}"/>
-              </a:ext>
-            </a:extLst>
-          </p:cNvPr>
-          <p:cNvSpPr>
-            <a:spLocks noGrp="1"/>
-          </p:cNvSpPr>
-          <p:nvPr>
-            <p:ph type="sldNum" sz="quarter" idx="12"/>
-          </p:nvPr>
-        </p:nvSpPr>
-        <p:spPr/>
-        <p:txBody>
-          <a:bodyPr/>
-          <a:lstStyle/>
-          <a:p>
-            <a:fld id="{98D7FCF7-E335-7149-94FE-378378284473}" type="slidenum">
-              <a:rPr lang="en-US" smtClean="0"/>
-              <a:pPr/>
-              <a:t>4</a:t>
-            </a:fld>
-            <a:endParaRPr lang="en-US"/>
-          </a:p>
-        </p:txBody>
-      </p:sp>
-      <p:sp>
-        <p:nvSpPr>
           <p:cNvPr id="4" name="TextBox 3">
             <a:extLst>
               <a:ext uri="{FF2B5EF4-FFF2-40B4-BE49-F238E27FC236}">
@@ -5108,106 +4180,6 @@
   <p:clrMapOvr>
     <a:masterClrMapping/>
   </p:clrMapOvr>
-</p:sld>
-</file>
-
-<file path=ppt/slides/slide5.xml><?xml version="1.0" encoding="utf-8"?>
-<p:sld xmlns:a="http://schemas.openxmlformats.org/drawingml/2006/main" xmlns:r="http://schemas.openxmlformats.org/officeDocument/2006/relationships" xmlns:p="http://schemas.openxmlformats.org/presentationml/2006/main">
-  <p:cSld>
-    <p:spTree>
-      <p:nvGrpSpPr>
-        <p:cNvPr id="1" name=""/>
-        <p:cNvGrpSpPr/>
-        <p:nvPr/>
-      </p:nvGrpSpPr>
-      <p:grpSpPr>
-        <a:xfrm>
-          <a:off x="0" y="0"/>
-          <a:ext cx="0" cy="0"/>
-          <a:chOff x="0" y="0"/>
-          <a:chExt cx="0" cy="0"/>
-        </a:xfrm>
-      </p:grpSpPr>
-      <p:sp>
-        <p:nvSpPr>
-          <p:cNvPr id="2" name="Title 1">
-            <a:extLst>
-              <a:ext uri="{FF2B5EF4-FFF2-40B4-BE49-F238E27FC236}">
-                <a16:creationId xmlns:a16="http://schemas.microsoft.com/office/drawing/2014/main" id="{70CACA32-2042-3A2E-13EE-6C800A7F8663}"/>
-              </a:ext>
-            </a:extLst>
-          </p:cNvPr>
-          <p:cNvSpPr>
-            <a:spLocks noGrp="1"/>
-          </p:cNvSpPr>
-          <p:nvPr>
-            <p:ph type="ctrTitle"/>
-          </p:nvPr>
-        </p:nvSpPr>
-        <p:spPr/>
-        <p:txBody>
-          <a:bodyPr/>
-          <a:lstStyle/>
-          <a:p>
-            <a:r>
-              <a:rPr lang="en-US"/>
-              <a:t>Q&amp;A</a:t>
-            </a:r>
-          </a:p>
-        </p:txBody>
-      </p:sp>
-      <p:sp>
-        <p:nvSpPr>
-          <p:cNvPr id="3" name="Slide Number Placeholder 2">
-            <a:extLst>
-              <a:ext uri="{FF2B5EF4-FFF2-40B4-BE49-F238E27FC236}">
-                <a16:creationId xmlns:a16="http://schemas.microsoft.com/office/drawing/2014/main" id="{452BBB43-8621-5456-5A3D-D90FA116511F}"/>
-              </a:ext>
-            </a:extLst>
-          </p:cNvPr>
-          <p:cNvSpPr>
-            <a:spLocks noGrp="1"/>
-          </p:cNvSpPr>
-          <p:nvPr>
-            <p:ph type="sldNum" sz="quarter" idx="12"/>
-          </p:nvPr>
-        </p:nvSpPr>
-        <p:spPr/>
-        <p:txBody>
-          <a:bodyPr/>
-          <a:lstStyle/>
-          <a:p>
-            <a:fld id="{98D7FCF7-E335-7149-94FE-378378284473}" type="slidenum">
-              <a:rPr lang="en-US" smtClean="0"/>
-              <a:pPr/>
-              <a:t>5</a:t>
-            </a:fld>
-            <a:endParaRPr lang="en-US"/>
-          </a:p>
-        </p:txBody>
-      </p:sp>
-    </p:spTree>
-    <p:extLst>
-      <p:ext uri="{BB962C8B-B14F-4D97-AF65-F5344CB8AC3E}">
-        <p14:creationId xmlns:p14="http://schemas.microsoft.com/office/powerpoint/2010/main" val="3289234773"/>
-      </p:ext>
-    </p:extLst>
-  </p:cSld>
-  <p:clrMapOvr>
-    <a:masterClrMapping/>
-  </p:clrMapOvr>
-  <mc:AlternateContent xmlns:mc="http://schemas.openxmlformats.org/markup-compatibility/2006" xmlns:p159="http://schemas.microsoft.com/office/powerpoint/2015/09/main">
-    <mc:Choice Requires="p159">
-      <p:transition xmlns:p14="http://schemas.microsoft.com/office/powerpoint/2010/main" spd="slow" p14:dur="2000">
-        <p159:morph option="byObject"/>
-      </p:transition>
-    </mc:Choice>
-    <mc:Fallback xmlns="">
-      <p:transition spd="slow">
-        <p:fade/>
-      </p:transition>
-    </mc:Fallback>
-  </mc:AlternateContent>
 </p:sld>
 </file>
 

</xml_diff>